<commit_message>
Added some additional diagrams. Starting hardware documentation.
</commit_message>
<xml_diff>
--- a/Documentation/osc-buttons.pptx
+++ b/Documentation/osc-buttons.pptx
@@ -6,6 +6,7 @@
   </p:sldMasterIdLst>
   <p:sldIdLst>
     <p:sldId id="256" r:id="rId2"/>
+    <p:sldId id="257" r:id="rId3"/>
   </p:sldIdLst>
   <p:sldSz cx="12192000" cy="6858000"/>
   <p:notesSz cx="6858000" cy="9144000"/>
@@ -3820,6 +3821,240 @@
 </p:sld>
 </file>
 
+<file path=ppt/slides/slide2.xml><?xml version="1.0" encoding="utf-8"?>
+<p:sld xmlns:a="http://schemas.openxmlformats.org/drawingml/2006/main" xmlns:r="http://schemas.openxmlformats.org/officeDocument/2006/relationships" xmlns:p="http://schemas.openxmlformats.org/presentationml/2006/main">
+  <p:cSld>
+    <p:spTree>
+      <p:nvGrpSpPr>
+        <p:cNvPr id="1" name=""/>
+        <p:cNvGrpSpPr/>
+        <p:nvPr/>
+      </p:nvGrpSpPr>
+      <p:grpSpPr>
+        <a:xfrm>
+          <a:off x="0" y="0"/>
+          <a:ext cx="0" cy="0"/>
+          <a:chOff x="0" y="0"/>
+          <a:chExt cx="0" cy="0"/>
+        </a:xfrm>
+      </p:grpSpPr>
+      <p:pic>
+        <p:nvPicPr>
+          <p:cNvPr id="4" name="Picture 3"/>
+          <p:cNvPicPr>
+            <a:picLocks noChangeAspect="1"/>
+          </p:cNvPicPr>
+          <p:nvPr/>
+        </p:nvPicPr>
+        <p:blipFill rotWithShape="1">
+          <a:blip r:embed="rId2"/>
+          <a:srcRect l="13506" r="13651"/>
+          <a:stretch/>
+        </p:blipFill>
+        <p:spPr>
+          <a:xfrm>
+            <a:off x="0" y="0"/>
+            <a:ext cx="8912180" cy="6878656"/>
+          </a:xfrm>
+          <a:prstGeom prst="rect">
+            <a:avLst/>
+          </a:prstGeom>
+        </p:spPr>
+      </p:pic>
+      <p:sp>
+        <p:nvSpPr>
+          <p:cNvPr id="5" name="Freeform 4"/>
+          <p:cNvSpPr/>
+          <p:nvPr/>
+        </p:nvSpPr>
+        <p:spPr>
+          <a:xfrm>
+            <a:off x="321972" y="2498501"/>
+            <a:ext cx="1558343" cy="3773510"/>
+          </a:xfrm>
+          <a:custGeom>
+            <a:avLst/>
+            <a:gdLst>
+              <a:gd name="connsiteX0" fmla="*/ 0 w 1558343"/>
+              <a:gd name="connsiteY0" fmla="*/ 0 h 3773510"/>
+              <a:gd name="connsiteX1" fmla="*/ 901521 w 1558343"/>
+              <a:gd name="connsiteY1" fmla="*/ 0 h 3773510"/>
+              <a:gd name="connsiteX2" fmla="*/ 1133341 w 1558343"/>
+              <a:gd name="connsiteY2" fmla="*/ 399245 h 3773510"/>
+              <a:gd name="connsiteX3" fmla="*/ 1120462 w 1558343"/>
+              <a:gd name="connsiteY3" fmla="*/ 2408350 h 3773510"/>
+              <a:gd name="connsiteX4" fmla="*/ 1545465 w 1558343"/>
+              <a:gd name="connsiteY4" fmla="*/ 2781837 h 3773510"/>
+              <a:gd name="connsiteX5" fmla="*/ 1558343 w 1558343"/>
+              <a:gd name="connsiteY5" fmla="*/ 3773510 h 3773510"/>
+              <a:gd name="connsiteX6" fmla="*/ 12879 w 1558343"/>
+              <a:gd name="connsiteY6" fmla="*/ 3773510 h 3773510"/>
+              <a:gd name="connsiteX7" fmla="*/ 0 w 1558343"/>
+              <a:gd name="connsiteY7" fmla="*/ 0 h 3773510"/>
+              <a:gd name="connsiteX0" fmla="*/ 0 w 1558343"/>
+              <a:gd name="connsiteY0" fmla="*/ 0 h 3773510"/>
+              <a:gd name="connsiteX1" fmla="*/ 901521 w 1558343"/>
+              <a:gd name="connsiteY1" fmla="*/ 0 h 3773510"/>
+              <a:gd name="connsiteX2" fmla="*/ 1133341 w 1558343"/>
+              <a:gd name="connsiteY2" fmla="*/ 399245 h 3773510"/>
+              <a:gd name="connsiteX3" fmla="*/ 1120462 w 1558343"/>
+              <a:gd name="connsiteY3" fmla="*/ 2408350 h 3773510"/>
+              <a:gd name="connsiteX4" fmla="*/ 1545465 w 1558343"/>
+              <a:gd name="connsiteY4" fmla="*/ 2781837 h 3773510"/>
+              <a:gd name="connsiteX5" fmla="*/ 1558343 w 1558343"/>
+              <a:gd name="connsiteY5" fmla="*/ 3773510 h 3773510"/>
+              <a:gd name="connsiteX6" fmla="*/ 0 w 1558343"/>
+              <a:gd name="connsiteY6" fmla="*/ 3773510 h 3773510"/>
+              <a:gd name="connsiteX7" fmla="*/ 0 w 1558343"/>
+              <a:gd name="connsiteY7" fmla="*/ 0 h 3773510"/>
+              <a:gd name="connsiteX0" fmla="*/ 0 w 1558343"/>
+              <a:gd name="connsiteY0" fmla="*/ 0 h 3773510"/>
+              <a:gd name="connsiteX1" fmla="*/ 901521 w 1558343"/>
+              <a:gd name="connsiteY1" fmla="*/ 0 h 3773510"/>
+              <a:gd name="connsiteX2" fmla="*/ 1107584 w 1558343"/>
+              <a:gd name="connsiteY2" fmla="*/ 244698 h 3773510"/>
+              <a:gd name="connsiteX3" fmla="*/ 1120462 w 1558343"/>
+              <a:gd name="connsiteY3" fmla="*/ 2408350 h 3773510"/>
+              <a:gd name="connsiteX4" fmla="*/ 1545465 w 1558343"/>
+              <a:gd name="connsiteY4" fmla="*/ 2781837 h 3773510"/>
+              <a:gd name="connsiteX5" fmla="*/ 1558343 w 1558343"/>
+              <a:gd name="connsiteY5" fmla="*/ 3773510 h 3773510"/>
+              <a:gd name="connsiteX6" fmla="*/ 0 w 1558343"/>
+              <a:gd name="connsiteY6" fmla="*/ 3773510 h 3773510"/>
+              <a:gd name="connsiteX7" fmla="*/ 0 w 1558343"/>
+              <a:gd name="connsiteY7" fmla="*/ 0 h 3773510"/>
+              <a:gd name="connsiteX0" fmla="*/ 0 w 1558343"/>
+              <a:gd name="connsiteY0" fmla="*/ 0 h 3773510"/>
+              <a:gd name="connsiteX1" fmla="*/ 901521 w 1558343"/>
+              <a:gd name="connsiteY1" fmla="*/ 0 h 3773510"/>
+              <a:gd name="connsiteX2" fmla="*/ 1120463 w 1558343"/>
+              <a:gd name="connsiteY2" fmla="*/ 309092 h 3773510"/>
+              <a:gd name="connsiteX3" fmla="*/ 1120462 w 1558343"/>
+              <a:gd name="connsiteY3" fmla="*/ 2408350 h 3773510"/>
+              <a:gd name="connsiteX4" fmla="*/ 1545465 w 1558343"/>
+              <a:gd name="connsiteY4" fmla="*/ 2781837 h 3773510"/>
+              <a:gd name="connsiteX5" fmla="*/ 1558343 w 1558343"/>
+              <a:gd name="connsiteY5" fmla="*/ 3773510 h 3773510"/>
+              <a:gd name="connsiteX6" fmla="*/ 0 w 1558343"/>
+              <a:gd name="connsiteY6" fmla="*/ 3773510 h 3773510"/>
+              <a:gd name="connsiteX7" fmla="*/ 0 w 1558343"/>
+              <a:gd name="connsiteY7" fmla="*/ 0 h 3773510"/>
+              <a:gd name="connsiteX0" fmla="*/ 0 w 1558343"/>
+              <a:gd name="connsiteY0" fmla="*/ 0 h 3773510"/>
+              <a:gd name="connsiteX1" fmla="*/ 901521 w 1558343"/>
+              <a:gd name="connsiteY1" fmla="*/ 0 h 3773510"/>
+              <a:gd name="connsiteX2" fmla="*/ 1120463 w 1558343"/>
+              <a:gd name="connsiteY2" fmla="*/ 309092 h 3773510"/>
+              <a:gd name="connsiteX3" fmla="*/ 1120462 w 1558343"/>
+              <a:gd name="connsiteY3" fmla="*/ 2408350 h 3773510"/>
+              <a:gd name="connsiteX4" fmla="*/ 1545465 w 1558343"/>
+              <a:gd name="connsiteY4" fmla="*/ 2781837 h 3773510"/>
+              <a:gd name="connsiteX5" fmla="*/ 1558343 w 1558343"/>
+              <a:gd name="connsiteY5" fmla="*/ 3773510 h 3773510"/>
+              <a:gd name="connsiteX6" fmla="*/ 0 w 1558343"/>
+              <a:gd name="connsiteY6" fmla="*/ 3773510 h 3773510"/>
+              <a:gd name="connsiteX7" fmla="*/ 0 w 1558343"/>
+              <a:gd name="connsiteY7" fmla="*/ 0 h 3773510"/>
+            </a:gdLst>
+            <a:ahLst/>
+            <a:cxnLst>
+              <a:cxn ang="0">
+                <a:pos x="connsiteX0" y="connsiteY0"/>
+              </a:cxn>
+              <a:cxn ang="0">
+                <a:pos x="connsiteX1" y="connsiteY1"/>
+              </a:cxn>
+              <a:cxn ang="0">
+                <a:pos x="connsiteX2" y="connsiteY2"/>
+              </a:cxn>
+              <a:cxn ang="0">
+                <a:pos x="connsiteX3" y="connsiteY3"/>
+              </a:cxn>
+              <a:cxn ang="0">
+                <a:pos x="connsiteX4" y="connsiteY4"/>
+              </a:cxn>
+              <a:cxn ang="0">
+                <a:pos x="connsiteX5" y="connsiteY5"/>
+              </a:cxn>
+              <a:cxn ang="0">
+                <a:pos x="connsiteX6" y="connsiteY6"/>
+              </a:cxn>
+              <a:cxn ang="0">
+                <a:pos x="connsiteX7" y="connsiteY7"/>
+              </a:cxn>
+            </a:cxnLst>
+            <a:rect l="l" t="t" r="r" b="b"/>
+            <a:pathLst>
+              <a:path w="1558343" h="3773510">
+                <a:moveTo>
+                  <a:pt x="0" y="0"/>
+                </a:moveTo>
+                <a:lnTo>
+                  <a:pt x="901521" y="0"/>
+                </a:lnTo>
+                <a:lnTo>
+                  <a:pt x="1120463" y="309092"/>
+                </a:lnTo>
+                <a:cubicBezTo>
+                  <a:pt x="1124756" y="1030309"/>
+                  <a:pt x="1116169" y="1687133"/>
+                  <a:pt x="1120462" y="2408350"/>
+                </a:cubicBezTo>
+                <a:lnTo>
+                  <a:pt x="1545465" y="2781837"/>
+                </a:lnTo>
+                <a:lnTo>
+                  <a:pt x="1558343" y="3773510"/>
+                </a:lnTo>
+                <a:lnTo>
+                  <a:pt x="0" y="3773510"/>
+                </a:lnTo>
+                <a:lnTo>
+                  <a:pt x="0" y="0"/>
+                </a:lnTo>
+                <a:close/>
+              </a:path>
+            </a:pathLst>
+          </a:custGeom>
+        </p:spPr>
+        <p:style>
+          <a:lnRef idx="2">
+            <a:schemeClr val="accent1">
+              <a:shade val="50000"/>
+            </a:schemeClr>
+          </a:lnRef>
+          <a:fillRef idx="1">
+            <a:schemeClr val="accent1"/>
+          </a:fillRef>
+          <a:effectRef idx="0">
+            <a:schemeClr val="accent1"/>
+          </a:effectRef>
+          <a:fontRef idx="minor">
+            <a:schemeClr val="lt1"/>
+          </a:fontRef>
+        </p:style>
+        <p:txBody>
+          <a:bodyPr rtlCol="0" anchor="ctr"/>
+          <a:lstStyle/>
+          <a:p>
+            <a:pPr algn="ctr"/>
+            <a:endParaRPr lang="en-US"/>
+          </a:p>
+        </p:txBody>
+      </p:sp>
+    </p:spTree>
+    <p:extLst>
+      <p:ext uri="{BB962C8B-B14F-4D97-AF65-F5344CB8AC3E}">
+        <p14:creationId xmlns:p14="http://schemas.microsoft.com/office/powerpoint/2010/main" val="3105206947"/>
+      </p:ext>
+    </p:extLst>
+  </p:cSld>
+  <p:clrMapOvr>
+    <a:masterClrMapping/>
+  </p:clrMapOvr>
+</p:sld>
+</file>
+
 <file path=ppt/theme/theme1.xml><?xml version="1.0" encoding="utf-8"?>
 <a:theme xmlns:a="http://schemas.openxmlformats.org/drawingml/2006/main" name="Office Theme">
   <a:themeElements>

</xml_diff>